<commit_message>
update merge date parts & presi
</commit_message>
<xml_diff>
--- a/Grand_Präsi.pptx
+++ b/Grand_Präsi.pptx
@@ -2760,7 +2760,7 @@
             <a:fld id="{4CBF50E3-ED67-46F2-ABFC-A36EE1082CF7}" type="slidenum">
               <a:rPr lang="en-US" b="1" smtClean="0"/>
               <a:pPr/>
-              <a:t>15</a:t>
+              <a:t>14</a:t>
             </a:fld>
             <a:endParaRPr lang="en-US" b="1" dirty="0"/>
           </a:p>
@@ -2769,7 +2769,7 @@
     </p:spTree>
     <p:extLst>
       <p:ext uri="{BB962C8B-B14F-4D97-AF65-F5344CB8AC3E}">
-        <p14:creationId xmlns:p14="http://schemas.microsoft.com/office/powerpoint/2010/main" val="1254936349"/>
+        <p14:creationId xmlns:p14="http://schemas.microsoft.com/office/powerpoint/2010/main" val="577263827"/>
       </p:ext>
     </p:extLst>
   </p:cSld>
@@ -2798,7 +2798,7 @@
       </p:grpSpPr>
       <p:sp>
         <p:nvSpPr>
-          <p:cNvPr id="2" name="Slide Image Placeholder 1"/>
+          <p:cNvPr id="8" name="Slide Image Placeholder 7"/>
           <p:cNvSpPr>
             <a:spLocks noGrp="1" noRot="1" noChangeAspect="1"/>
           </p:cNvSpPr>
@@ -2806,7 +2806,7 @@
             <p:ph type="sldImg"/>
           </p:nvPr>
         </p:nvSpPr>
-        <p:spPr>
+        <p:spPr bwMode="gray">
           <a:xfrm>
             <a:off x="876300" y="885825"/>
             <a:ext cx="5576888" cy="3136900"/>
@@ -2815,7 +2815,7 @@
       </p:sp>
       <p:sp>
         <p:nvSpPr>
-          <p:cNvPr id="3" name="Notes Placeholder 2"/>
+          <p:cNvPr id="9" name="Notes Placeholder 8"/>
           <p:cNvSpPr>
             <a:spLocks noGrp="1"/>
           </p:cNvSpPr>
@@ -2823,7 +2823,7 @@
             <p:ph type="body" idx="1"/>
           </p:nvPr>
         </p:nvSpPr>
-        <p:spPr/>
+        <p:spPr bwMode="gray"/>
         <p:txBody>
           <a:bodyPr/>
           <a:lstStyle/>
@@ -2834,7 +2834,7 @@
       </p:sp>
       <p:sp>
         <p:nvSpPr>
-          <p:cNvPr id="4" name="Slide Number Placeholder 3"/>
+          <p:cNvPr id="10" name="Slide Number Placeholder 9"/>
           <p:cNvSpPr>
             <a:spLocks noGrp="1"/>
           </p:cNvSpPr>
@@ -2854,7 +2854,7 @@
             <a:fld id="{4CBF50E3-ED67-46F2-ABFC-A36EE1082CF7}" type="slidenum">
               <a:rPr lang="en-US" b="1" smtClean="0"/>
               <a:pPr/>
-              <a:t>16</a:t>
+              <a:t>15</a:t>
             </a:fld>
             <a:endParaRPr lang="en-US" b="1" dirty="0"/>
           </a:p>
@@ -2863,7 +2863,7 @@
     </p:spTree>
     <p:extLst>
       <p:ext uri="{BB962C8B-B14F-4D97-AF65-F5344CB8AC3E}">
-        <p14:creationId xmlns:p14="http://schemas.microsoft.com/office/powerpoint/2010/main" val="1584324230"/>
+        <p14:creationId xmlns:p14="http://schemas.microsoft.com/office/powerpoint/2010/main" val="1254936349"/>
       </p:ext>
     </p:extLst>
   </p:cSld>
@@ -2948,7 +2948,7 @@
             <a:fld id="{4CBF50E3-ED67-46F2-ABFC-A36EE1082CF7}" type="slidenum">
               <a:rPr lang="en-US" b="1" smtClean="0"/>
               <a:pPr/>
-              <a:t>17</a:t>
+              <a:t>16</a:t>
             </a:fld>
             <a:endParaRPr lang="en-US" b="1" dirty="0"/>
           </a:p>
@@ -2957,7 +2957,7 @@
     </p:spTree>
     <p:extLst>
       <p:ext uri="{BB962C8B-B14F-4D97-AF65-F5344CB8AC3E}">
-        <p14:creationId xmlns:p14="http://schemas.microsoft.com/office/powerpoint/2010/main" val="128533741"/>
+        <p14:creationId xmlns:p14="http://schemas.microsoft.com/office/powerpoint/2010/main" val="1584324230"/>
       </p:ext>
     </p:extLst>
   </p:cSld>
@@ -3042,6 +3042,100 @@
             <a:fld id="{4CBF50E3-ED67-46F2-ABFC-A36EE1082CF7}" type="slidenum">
               <a:rPr lang="en-US" b="1" smtClean="0"/>
               <a:pPr/>
+              <a:t>17</a:t>
+            </a:fld>
+            <a:endParaRPr lang="en-US" b="1" dirty="0"/>
+          </a:p>
+        </p:txBody>
+      </p:sp>
+    </p:spTree>
+    <p:extLst>
+      <p:ext uri="{BB962C8B-B14F-4D97-AF65-F5344CB8AC3E}">
+        <p14:creationId xmlns:p14="http://schemas.microsoft.com/office/powerpoint/2010/main" val="128533741"/>
+      </p:ext>
+    </p:extLst>
+  </p:cSld>
+  <p:clrMapOvr>
+    <a:masterClrMapping/>
+  </p:clrMapOvr>
+</p:notes>
+</file>
+
+<file path=ppt/notesSlides/notesSlide14.xml><?xml version="1.0" encoding="utf-8"?>
+<p:notes xmlns:a="http://schemas.openxmlformats.org/drawingml/2006/main" xmlns:r="http://schemas.openxmlformats.org/officeDocument/2006/relationships" xmlns:p="http://schemas.openxmlformats.org/presentationml/2006/main">
+  <p:cSld>
+    <p:spTree>
+      <p:nvGrpSpPr>
+        <p:cNvPr id="1" name=""/>
+        <p:cNvGrpSpPr/>
+        <p:nvPr/>
+      </p:nvGrpSpPr>
+      <p:grpSpPr>
+        <a:xfrm>
+          <a:off x="0" y="0"/>
+          <a:ext cx="0" cy="0"/>
+          <a:chOff x="0" y="0"/>
+          <a:chExt cx="0" cy="0"/>
+        </a:xfrm>
+      </p:grpSpPr>
+      <p:sp>
+        <p:nvSpPr>
+          <p:cNvPr id="2" name="Slide Image Placeholder 1"/>
+          <p:cNvSpPr>
+            <a:spLocks noGrp="1" noRot="1" noChangeAspect="1"/>
+          </p:cNvSpPr>
+          <p:nvPr>
+            <p:ph type="sldImg"/>
+          </p:nvPr>
+        </p:nvSpPr>
+        <p:spPr>
+          <a:xfrm>
+            <a:off x="876300" y="885825"/>
+            <a:ext cx="5576888" cy="3136900"/>
+          </a:xfrm>
+        </p:spPr>
+      </p:sp>
+      <p:sp>
+        <p:nvSpPr>
+          <p:cNvPr id="3" name="Notes Placeholder 2"/>
+          <p:cNvSpPr>
+            <a:spLocks noGrp="1"/>
+          </p:cNvSpPr>
+          <p:nvPr>
+            <p:ph type="body" idx="1"/>
+          </p:nvPr>
+        </p:nvSpPr>
+        <p:spPr/>
+        <p:txBody>
+          <a:bodyPr/>
+          <a:lstStyle/>
+          <a:p>
+            <a:endParaRPr lang="en-US"/>
+          </a:p>
+        </p:txBody>
+      </p:sp>
+      <p:sp>
+        <p:nvSpPr>
+          <p:cNvPr id="4" name="Slide Number Placeholder 3"/>
+          <p:cNvSpPr>
+            <a:spLocks noGrp="1"/>
+          </p:cNvSpPr>
+          <p:nvPr>
+            <p:ph type="sldNum" sz="quarter" idx="10"/>
+          </p:nvPr>
+        </p:nvSpPr>
+        <p:spPr/>
+        <p:txBody>
+          <a:bodyPr/>
+          <a:lstStyle/>
+          <a:p>
+            <a:r>
+              <a:rPr lang="en-US"/>
+              <a:t>Chart </a:t>
+            </a:r>
+            <a:fld id="{4CBF50E3-ED67-46F2-ABFC-A36EE1082CF7}" type="slidenum">
+              <a:rPr lang="en-US" b="1" smtClean="0"/>
+              <a:pPr/>
               <a:t>18</a:t>
             </a:fld>
             <a:endParaRPr lang="en-US" b="1" dirty="0"/>
@@ -3061,7 +3155,7 @@
 </p:notes>
 </file>
 
-<file path=ppt/notesSlides/notesSlide14.xml><?xml version="1.0" encoding="utf-8"?>
+<file path=ppt/notesSlides/notesSlide15.xml><?xml version="1.0" encoding="utf-8"?>
 <p:notes xmlns:a="http://schemas.openxmlformats.org/drawingml/2006/main" xmlns:r="http://schemas.openxmlformats.org/officeDocument/2006/relationships" xmlns:p="http://schemas.openxmlformats.org/presentationml/2006/main">
   <p:cSld>
     <p:spTree>
@@ -3801,6 +3895,34 @@
           <a:bodyPr/>
           <a:lstStyle/>
           <a:p>
+            <a:r>
+              <a:rPr lang="de-DE" dirty="0" err="1"/>
+              <a:t>Implemented</a:t>
+            </a:r>
+            <a:r>
+              <a:rPr lang="de-DE" dirty="0"/>
+              <a:t> </a:t>
+            </a:r>
+            <a:r>
+              <a:rPr lang="de-DE" dirty="0" err="1"/>
+              <a:t>as</a:t>
+            </a:r>
+            <a:r>
+              <a:rPr lang="de-DE" dirty="0"/>
+              <a:t> a </a:t>
+            </a:r>
+            <a:r>
+              <a:rPr lang="de-DE" dirty="0" err="1"/>
+              <a:t>second</a:t>
+            </a:r>
+            <a:r>
+              <a:rPr lang="de-DE" dirty="0"/>
+              <a:t> </a:t>
+            </a:r>
+            <a:r>
+              <a:rPr lang="de-DE" dirty="0" err="1"/>
+              <a:t>prep</a:t>
+            </a:r>
             <a:endParaRPr lang="en-US" dirty="0"/>
           </a:p>
         </p:txBody>
@@ -3827,7 +3949,7 @@
             <a:fld id="{4CBF50E3-ED67-46F2-ABFC-A36EE1082CF7}" type="slidenum">
               <a:rPr lang="en-US" b="1" smtClean="0"/>
               <a:pPr/>
-              <a:t>9</a:t>
+              <a:t>8</a:t>
             </a:fld>
             <a:endParaRPr lang="en-US" b="1" dirty="0"/>
           </a:p>
@@ -3836,7 +3958,7 @@
     </p:spTree>
     <p:extLst>
       <p:ext uri="{BB962C8B-B14F-4D97-AF65-F5344CB8AC3E}">
-        <p14:creationId xmlns:p14="http://schemas.microsoft.com/office/powerpoint/2010/main" val="3872117249"/>
+        <p14:creationId xmlns:p14="http://schemas.microsoft.com/office/powerpoint/2010/main" val="3368534962"/>
       </p:ext>
     </p:extLst>
   </p:cSld>
@@ -3895,28 +4017,7 @@
           <a:bodyPr/>
           <a:lstStyle/>
           <a:p>
-            <a:r>
-              <a:rPr lang="de-DE" dirty="0"/>
-              <a:t>L</a:t>
-            </a:r>
-            <a:r>
-              <a:rPr lang="en-US" dirty="0" err="1"/>
-              <a:t>ongest</a:t>
-            </a:r>
-            <a:r>
-              <a:rPr lang="en-US" dirty="0"/>
-              <a:t> common substring</a:t>
-            </a:r>
-          </a:p>
-          <a:p>
-            <a:r>
-              <a:rPr lang="de-DE" dirty="0"/>
-              <a:t>A</a:t>
-            </a:r>
-            <a:r>
-              <a:rPr lang="en-US" dirty="0"/>
-              <a:t>analyze of Null values (scoring via cross joins)</a:t>
-            </a:r>
+            <a:endParaRPr lang="en-US" dirty="0"/>
           </a:p>
         </p:txBody>
       </p:sp>
@@ -3942,7 +4043,7 @@
             <a:fld id="{4CBF50E3-ED67-46F2-ABFC-A36EE1082CF7}" type="slidenum">
               <a:rPr lang="en-US" b="1" smtClean="0"/>
               <a:pPr/>
-              <a:t>10</a:t>
+              <a:t>9</a:t>
             </a:fld>
             <a:endParaRPr lang="en-US" b="1" dirty="0"/>
           </a:p>
@@ -3951,7 +4052,7 @@
     </p:spTree>
     <p:extLst>
       <p:ext uri="{BB962C8B-B14F-4D97-AF65-F5344CB8AC3E}">
-        <p14:creationId xmlns:p14="http://schemas.microsoft.com/office/powerpoint/2010/main" val="3657686883"/>
+        <p14:creationId xmlns:p14="http://schemas.microsoft.com/office/powerpoint/2010/main" val="3872117249"/>
       </p:ext>
     </p:extLst>
   </p:cSld>
@@ -3980,7 +4081,7 @@
       </p:grpSpPr>
       <p:sp>
         <p:nvSpPr>
-          <p:cNvPr id="8" name="Slide Image Placeholder 7"/>
+          <p:cNvPr id="2" name="Folienbildplatzhalter 1"/>
           <p:cNvSpPr>
             <a:spLocks noGrp="1" noRot="1" noChangeAspect="1"/>
           </p:cNvSpPr>
@@ -3988,7 +4089,7 @@
             <p:ph type="sldImg"/>
           </p:nvPr>
         </p:nvSpPr>
-        <p:spPr bwMode="gray">
+        <p:spPr>
           <a:xfrm>
             <a:off x="876300" y="885825"/>
             <a:ext cx="5576888" cy="3136900"/>
@@ -3997,7 +4098,7 @@
       </p:sp>
       <p:sp>
         <p:nvSpPr>
-          <p:cNvPr id="9" name="Notes Placeholder 8"/>
+          <p:cNvPr id="3" name="Notizenplatzhalter 2"/>
           <p:cNvSpPr>
             <a:spLocks noGrp="1"/>
           </p:cNvSpPr>
@@ -4005,23 +4106,48 @@
             <p:ph type="body" idx="1"/>
           </p:nvPr>
         </p:nvSpPr>
-        <p:spPr bwMode="gray"/>
+        <p:spPr/>
         <p:txBody>
           <a:bodyPr/>
           <a:lstStyle/>
           <a:p>
-            <a:endParaRPr lang="en-US"/>
-          </a:p>
-        </p:txBody>
-      </p:sp>
-      <p:sp>
-        <p:nvSpPr>
-          <p:cNvPr id="10" name="Slide Number Placeholder 9"/>
-          <p:cNvSpPr>
-            <a:spLocks noGrp="1"/>
-          </p:cNvSpPr>
-          <p:nvPr>
-            <p:ph type="sldNum" sz="quarter" idx="10"/>
+            <a:r>
+              <a:rPr lang="de-DE" dirty="0"/>
+              <a:t>L</a:t>
+            </a:r>
+            <a:r>
+              <a:rPr lang="en-US" dirty="0" err="1"/>
+              <a:t>ongest</a:t>
+            </a:r>
+            <a:r>
+              <a:rPr lang="en-US" dirty="0"/>
+              <a:t> common substring</a:t>
+            </a:r>
+          </a:p>
+          <a:p>
+            <a:r>
+              <a:rPr lang="de-DE" dirty="0"/>
+              <a:t>A</a:t>
+            </a:r>
+            <a:r>
+              <a:rPr lang="en-US" dirty="0" err="1"/>
+              <a:t>nalyze</a:t>
+            </a:r>
+            <a:r>
+              <a:rPr lang="en-US" dirty="0"/>
+              <a:t> of Null values (scoring via cross joins)</a:t>
+            </a:r>
+          </a:p>
+        </p:txBody>
+      </p:sp>
+      <p:sp>
+        <p:nvSpPr>
+          <p:cNvPr id="4" name="Foliennummernplatzhalter 3"/>
+          <p:cNvSpPr>
+            <a:spLocks noGrp="1"/>
+          </p:cNvSpPr>
+          <p:nvPr>
+            <p:ph type="sldNum" sz="quarter" idx="5"/>
           </p:nvPr>
         </p:nvSpPr>
         <p:spPr/>
@@ -4036,7 +4162,7 @@
             <a:fld id="{4CBF50E3-ED67-46F2-ABFC-A36EE1082CF7}" type="slidenum">
               <a:rPr lang="en-US" b="1" smtClean="0"/>
               <a:pPr/>
-              <a:t>12</a:t>
+              <a:t>10</a:t>
             </a:fld>
             <a:endParaRPr lang="en-US" b="1" dirty="0"/>
           </a:p>
@@ -4045,7 +4171,7 @@
     </p:spTree>
     <p:extLst>
       <p:ext uri="{BB962C8B-B14F-4D97-AF65-F5344CB8AC3E}">
-        <p14:creationId xmlns:p14="http://schemas.microsoft.com/office/powerpoint/2010/main" val="1915773074"/>
+        <p14:creationId xmlns:p14="http://schemas.microsoft.com/office/powerpoint/2010/main" val="3657686883"/>
       </p:ext>
     </p:extLst>
   </p:cSld>
@@ -4074,7 +4200,7 @@
       </p:grpSpPr>
       <p:sp>
         <p:nvSpPr>
-          <p:cNvPr id="6" name="Slide Image Placeholder 5"/>
+          <p:cNvPr id="8" name="Slide Image Placeholder 7"/>
           <p:cNvSpPr>
             <a:spLocks noGrp="1" noRot="1" noChangeAspect="1"/>
           </p:cNvSpPr>
@@ -4091,7 +4217,7 @@
       </p:sp>
       <p:sp>
         <p:nvSpPr>
-          <p:cNvPr id="7" name="Notes Placeholder 6"/>
+          <p:cNvPr id="9" name="Notes Placeholder 8"/>
           <p:cNvSpPr>
             <a:spLocks noGrp="1"/>
           </p:cNvSpPr>
@@ -4130,7 +4256,7 @@
             <a:fld id="{4CBF50E3-ED67-46F2-ABFC-A36EE1082CF7}" type="slidenum">
               <a:rPr lang="en-US" b="1" smtClean="0"/>
               <a:pPr/>
-              <a:t>13</a:t>
+              <a:t>12</a:t>
             </a:fld>
             <a:endParaRPr lang="en-US" b="1" dirty="0"/>
           </a:p>
@@ -4139,7 +4265,7 @@
     </p:spTree>
     <p:extLst>
       <p:ext uri="{BB962C8B-B14F-4D97-AF65-F5344CB8AC3E}">
-        <p14:creationId xmlns:p14="http://schemas.microsoft.com/office/powerpoint/2010/main" val="570977232"/>
+        <p14:creationId xmlns:p14="http://schemas.microsoft.com/office/powerpoint/2010/main" val="1915773074"/>
       </p:ext>
     </p:extLst>
   </p:cSld>
@@ -4168,7 +4294,7 @@
       </p:grpSpPr>
       <p:sp>
         <p:nvSpPr>
-          <p:cNvPr id="8" name="Slide Image Placeholder 7"/>
+          <p:cNvPr id="6" name="Slide Image Placeholder 5"/>
           <p:cNvSpPr>
             <a:spLocks noGrp="1" noRot="1" noChangeAspect="1"/>
           </p:cNvSpPr>
@@ -4185,7 +4311,7 @@
       </p:sp>
       <p:sp>
         <p:nvSpPr>
-          <p:cNvPr id="9" name="Notes Placeholder 8"/>
+          <p:cNvPr id="7" name="Notes Placeholder 6"/>
           <p:cNvSpPr>
             <a:spLocks noGrp="1"/>
           </p:cNvSpPr>
@@ -4224,7 +4350,7 @@
             <a:fld id="{4CBF50E3-ED67-46F2-ABFC-A36EE1082CF7}" type="slidenum">
               <a:rPr lang="en-US" b="1" smtClean="0"/>
               <a:pPr/>
-              <a:t>14</a:t>
+              <a:t>13</a:t>
             </a:fld>
             <a:endParaRPr lang="en-US" b="1" dirty="0"/>
           </a:p>
@@ -4233,7 +4359,7 @@
     </p:spTree>
     <p:extLst>
       <p:ext uri="{BB962C8B-B14F-4D97-AF65-F5344CB8AC3E}">
-        <p14:creationId xmlns:p14="http://schemas.microsoft.com/office/powerpoint/2010/main" val="577263827"/>
+        <p14:creationId xmlns:p14="http://schemas.microsoft.com/office/powerpoint/2010/main" val="570977232"/>
       </p:ext>
     </p:extLst>
   </p:cSld>
@@ -18158,7 +18284,7 @@
           <p:nvPr/>
         </p:nvPicPr>
         <p:blipFill>
-          <a:blip r:embed="rId2"/>
+          <a:blip r:embed="rId3"/>
           <a:stretch>
             <a:fillRect/>
           </a:stretch>
@@ -18572,10 +18698,10 @@
       </p:sp>
       <p:pic>
         <p:nvPicPr>
-          <p:cNvPr id="9" name="Grafik 8">
+          <p:cNvPr id="2" name="Grafik 1">
             <a:extLst>
               <a:ext uri="{FF2B5EF4-FFF2-40B4-BE49-F238E27FC236}">
-                <a16:creationId xmlns:a16="http://schemas.microsoft.com/office/drawing/2014/main" id="{EA745B6A-95B4-4BDA-A2FB-092A74C54495}"/>
+                <a16:creationId xmlns:a16="http://schemas.microsoft.com/office/drawing/2014/main" id="{E7BA6312-DBE5-4CAF-A16A-885794848D84}"/>
               </a:ext>
             </a:extLst>
           </p:cNvPr>
@@ -18592,8 +18718,8 @@
         </p:blipFill>
         <p:spPr>
           <a:xfrm>
-            <a:off x="358777" y="1770261"/>
-            <a:ext cx="7391400" cy="1962150"/>
+            <a:off x="539552" y="1847848"/>
+            <a:ext cx="6696275" cy="3112677"/>
           </a:xfrm>
           <a:prstGeom prst="rect">
             <a:avLst/>

</xml_diff>